<commit_message>
additional info for add_
</commit_message>
<xml_diff>
--- a/PalMod2022/docs/add_functionality.pptx
+++ b/PalMod2022/docs/add_functionality.pptx
@@ -15,6 +15,7 @@
     <p:sldId id="270" r:id="rId9"/>
     <p:sldId id="271" r:id="rId10"/>
     <p:sldId id="272" r:id="rId11"/>
+    <p:sldId id="273" r:id="rId12"/>
   </p:sldIdLst>
   <p:sldSz cx="12192000" cy="6858000"/>
   <p:notesSz cx="6858000" cy="9144000"/>
@@ -252,7 +253,7 @@
           <a:p>
             <a:fld id="{6A96EA6E-A9F3-40C8-A047-16E35C64F658}" type="datetimeFigureOut">
               <a:rPr lang="tr-TR" smtClean="0"/>
-              <a:t>14.04.2022</a:t>
+              <a:t>16.04.2022</a:t>
             </a:fld>
             <a:endParaRPr lang="tr-TR"/>
           </a:p>
@@ -422,7 +423,7 @@
           <a:p>
             <a:fld id="{6A96EA6E-A9F3-40C8-A047-16E35C64F658}" type="datetimeFigureOut">
               <a:rPr lang="tr-TR" smtClean="0"/>
-              <a:t>14.04.2022</a:t>
+              <a:t>16.04.2022</a:t>
             </a:fld>
             <a:endParaRPr lang="tr-TR"/>
           </a:p>
@@ -602,7 +603,7 @@
           <a:p>
             <a:fld id="{6A96EA6E-A9F3-40C8-A047-16E35C64F658}" type="datetimeFigureOut">
               <a:rPr lang="tr-TR" smtClean="0"/>
-              <a:t>14.04.2022</a:t>
+              <a:t>16.04.2022</a:t>
             </a:fld>
             <a:endParaRPr lang="tr-TR"/>
           </a:p>
@@ -772,7 +773,7 @@
           <a:p>
             <a:fld id="{6A96EA6E-A9F3-40C8-A047-16E35C64F658}" type="datetimeFigureOut">
               <a:rPr lang="tr-TR" smtClean="0"/>
-              <a:t>14.04.2022</a:t>
+              <a:t>16.04.2022</a:t>
             </a:fld>
             <a:endParaRPr lang="tr-TR"/>
           </a:p>
@@ -1018,7 +1019,7 @@
           <a:p>
             <a:fld id="{6A96EA6E-A9F3-40C8-A047-16E35C64F658}" type="datetimeFigureOut">
               <a:rPr lang="tr-TR" smtClean="0"/>
-              <a:t>14.04.2022</a:t>
+              <a:t>16.04.2022</a:t>
             </a:fld>
             <a:endParaRPr lang="tr-TR"/>
           </a:p>
@@ -1250,7 +1251,7 @@
           <a:p>
             <a:fld id="{6A96EA6E-A9F3-40C8-A047-16E35C64F658}" type="datetimeFigureOut">
               <a:rPr lang="tr-TR" smtClean="0"/>
-              <a:t>14.04.2022</a:t>
+              <a:t>16.04.2022</a:t>
             </a:fld>
             <a:endParaRPr lang="tr-TR"/>
           </a:p>
@@ -1617,7 +1618,7 @@
           <a:p>
             <a:fld id="{6A96EA6E-A9F3-40C8-A047-16E35C64F658}" type="datetimeFigureOut">
               <a:rPr lang="tr-TR" smtClean="0"/>
-              <a:t>14.04.2022</a:t>
+              <a:t>16.04.2022</a:t>
             </a:fld>
             <a:endParaRPr lang="tr-TR"/>
           </a:p>
@@ -1735,7 +1736,7 @@
           <a:p>
             <a:fld id="{6A96EA6E-A9F3-40C8-A047-16E35C64F658}" type="datetimeFigureOut">
               <a:rPr lang="tr-TR" smtClean="0"/>
-              <a:t>14.04.2022</a:t>
+              <a:t>16.04.2022</a:t>
             </a:fld>
             <a:endParaRPr lang="tr-TR"/>
           </a:p>
@@ -1830,7 +1831,7 @@
           <a:p>
             <a:fld id="{6A96EA6E-A9F3-40C8-A047-16E35C64F658}" type="datetimeFigureOut">
               <a:rPr lang="tr-TR" smtClean="0"/>
-              <a:t>14.04.2022</a:t>
+              <a:t>16.04.2022</a:t>
             </a:fld>
             <a:endParaRPr lang="tr-TR"/>
           </a:p>
@@ -2107,7 +2108,7 @@
           <a:p>
             <a:fld id="{6A96EA6E-A9F3-40C8-A047-16E35C64F658}" type="datetimeFigureOut">
               <a:rPr lang="tr-TR" smtClean="0"/>
-              <a:t>14.04.2022</a:t>
+              <a:t>16.04.2022</a:t>
             </a:fld>
             <a:endParaRPr lang="tr-TR"/>
           </a:p>
@@ -2360,7 +2361,7 @@
           <a:p>
             <a:fld id="{6A96EA6E-A9F3-40C8-A047-16E35C64F658}" type="datetimeFigureOut">
               <a:rPr lang="tr-TR" smtClean="0"/>
-              <a:t>14.04.2022</a:t>
+              <a:t>16.04.2022</a:t>
             </a:fld>
             <a:endParaRPr lang="tr-TR"/>
           </a:p>
@@ -2573,7 +2574,7 @@
           <a:p>
             <a:fld id="{6A96EA6E-A9F3-40C8-A047-16E35C64F658}" type="datetimeFigureOut">
               <a:rPr lang="tr-TR" smtClean="0"/>
-              <a:t>14.04.2022</a:t>
+              <a:t>16.04.2022</a:t>
             </a:fld>
             <a:endParaRPr lang="tr-TR"/>
           </a:p>
@@ -4769,6 +4770,1402 @@
   <p:clrMapOvr>
     <a:masterClrMapping/>
   </p:clrMapOvr>
+</p:sld>
+</file>
+
+<file path=ppt/slides/slide11.xml><?xml version="1.0" encoding="utf-8"?>
+<p:sld xmlns:a="http://schemas.openxmlformats.org/drawingml/2006/main" xmlns:r="http://schemas.openxmlformats.org/officeDocument/2006/relationships" xmlns:p="http://schemas.openxmlformats.org/presentationml/2006/main">
+  <p:cSld>
+    <p:spTree>
+      <p:nvGrpSpPr>
+        <p:cNvPr id="1" name=""/>
+        <p:cNvGrpSpPr/>
+        <p:nvPr/>
+      </p:nvGrpSpPr>
+      <p:grpSpPr>
+        <a:xfrm>
+          <a:off x="0" y="0"/>
+          <a:ext cx="0" cy="0"/>
+          <a:chOff x="0" y="0"/>
+          <a:chExt cx="0" cy="0"/>
+        </a:xfrm>
+      </p:grpSpPr>
+      <p:sp>
+        <p:nvSpPr>
+          <p:cNvPr id="2" name="Rectangle 1"/>
+          <p:cNvSpPr/>
+          <p:nvPr/>
+        </p:nvSpPr>
+        <p:spPr>
+          <a:xfrm>
+            <a:off x="0" y="2"/>
+            <a:ext cx="12192000" cy="1296364"/>
+          </a:xfrm>
+          <a:prstGeom prst="rect">
+            <a:avLst/>
+          </a:prstGeom>
+          <a:solidFill>
+            <a:srgbClr val="00ACE6"/>
+          </a:solidFill>
+          <a:ln>
+            <a:noFill/>
+          </a:ln>
+        </p:spPr>
+        <p:style>
+          <a:lnRef idx="2">
+            <a:schemeClr val="accent1">
+              <a:shade val="50000"/>
+            </a:schemeClr>
+          </a:lnRef>
+          <a:fillRef idx="1">
+            <a:schemeClr val="accent1"/>
+          </a:fillRef>
+          <a:effectRef idx="0">
+            <a:schemeClr val="accent1"/>
+          </a:effectRef>
+          <a:fontRef idx="minor">
+            <a:schemeClr val="lt1"/>
+          </a:fontRef>
+        </p:style>
+        <p:txBody>
+          <a:bodyPr rtlCol="0" anchor="ctr"/>
+          <a:lstStyle/>
+          <a:p>
+            <a:r>
+              <a:rPr lang="en-GB" sz="4800" b="1" dirty="0"/>
+              <a:t>add_</a:t>
+            </a:r>
+          </a:p>
+        </p:txBody>
+      </p:sp>
+      <p:sp>
+        <p:nvSpPr>
+          <p:cNvPr id="7" name="Isosceles Triangle 6"/>
+          <p:cNvSpPr/>
+          <p:nvPr/>
+        </p:nvSpPr>
+        <p:spPr>
+          <a:xfrm rot="5400000">
+            <a:off x="348693" y="1507756"/>
+            <a:ext cx="457812" cy="394666"/>
+          </a:xfrm>
+          <a:prstGeom prst="triangle">
+            <a:avLst/>
+          </a:prstGeom>
+          <a:solidFill>
+            <a:srgbClr val="00ACE6"/>
+          </a:solidFill>
+          <a:ln>
+            <a:noFill/>
+          </a:ln>
+        </p:spPr>
+        <p:style>
+          <a:lnRef idx="2">
+            <a:schemeClr val="accent1">
+              <a:shade val="50000"/>
+            </a:schemeClr>
+          </a:lnRef>
+          <a:fillRef idx="1">
+            <a:schemeClr val="accent1"/>
+          </a:fillRef>
+          <a:effectRef idx="0">
+            <a:schemeClr val="accent1"/>
+          </a:effectRef>
+          <a:fontRef idx="minor">
+            <a:schemeClr val="lt1"/>
+          </a:fontRef>
+        </p:style>
+        <p:txBody>
+          <a:bodyPr rtlCol="0" anchor="ctr"/>
+          <a:lstStyle/>
+          <a:p>
+            <a:pPr algn="ctr"/>
+            <a:endParaRPr lang="tr-TR"/>
+          </a:p>
+        </p:txBody>
+      </p:sp>
+      <p:sp>
+        <p:nvSpPr>
+          <p:cNvPr id="14" name="TextBox 13"/>
+          <p:cNvSpPr txBox="1"/>
+          <p:nvPr/>
+        </p:nvSpPr>
+        <p:spPr>
+          <a:xfrm>
+            <a:off x="1061012" y="1439162"/>
+            <a:ext cx="10069975" cy="4893647"/>
+          </a:xfrm>
+          <a:prstGeom prst="rect">
+            <a:avLst/>
+          </a:prstGeom>
+          <a:noFill/>
+          <a:ln>
+            <a:noFill/>
+          </a:ln>
+        </p:spPr>
+        <p:txBody>
+          <a:bodyPr wrap="square" rtlCol="0">
+            <a:spAutoFit/>
+          </a:bodyPr>
+          <a:lstStyle/>
+          <a:p>
+            <a:r>
+              <a:rPr lang="en-GB" sz="2400" b="1" dirty="0"/>
+              <a:t>Note</a:t>
+            </a:r>
+          </a:p>
+          <a:p>
+            <a:pPr marL="342900" indent="-342900">
+              <a:buFont typeface="Arial" panose="020B0604020202020204" pitchFamily="34" charset="0"/>
+              <a:buChar char="•"/>
+            </a:pPr>
+            <a:r>
+              <a:rPr lang="en-GB" sz="2400" dirty="0"/>
+              <a:t>add_ only works at the first level of indentation inside a section</a:t>
+            </a:r>
+          </a:p>
+          <a:p>
+            <a:pPr marL="342900" indent="-342900">
+              <a:buFont typeface="Arial" panose="020B0604020202020204" pitchFamily="34" charset="0"/>
+              <a:buChar char="•"/>
+            </a:pPr>
+            <a:endParaRPr lang="en-GB" sz="2400" dirty="0"/>
+          </a:p>
+          <a:p>
+            <a:pPr marL="342900" indent="-342900">
+              <a:buFont typeface="Arial" panose="020B0604020202020204" pitchFamily="34" charset="0"/>
+              <a:buChar char="•"/>
+            </a:pPr>
+            <a:endParaRPr lang="en-GB" sz="2400" dirty="0"/>
+          </a:p>
+          <a:p>
+            <a:pPr marL="342900" indent="-342900">
+              <a:buFont typeface="Arial" panose="020B0604020202020204" pitchFamily="34" charset="0"/>
+              <a:buChar char="•"/>
+            </a:pPr>
+            <a:endParaRPr lang="en-GB" sz="2400" dirty="0"/>
+          </a:p>
+          <a:p>
+            <a:endParaRPr lang="en-GB" sz="2400" dirty="0"/>
+          </a:p>
+          <a:p>
+            <a:pPr marL="342900" indent="-342900">
+              <a:buFont typeface="Arial" panose="020B0604020202020204" pitchFamily="34" charset="0"/>
+              <a:buChar char="•"/>
+            </a:pPr>
+            <a:r>
+              <a:rPr lang="en-GB" sz="2400" dirty="0"/>
+              <a:t>Or, in a file that has no sections (</a:t>
+            </a:r>
+            <a:r>
+              <a:rPr lang="en-GB" sz="2400" dirty="0">
+                <a:solidFill>
+                  <a:schemeClr val="accent2"/>
+                </a:solidFill>
+              </a:rPr>
+              <a:t>component</a:t>
+            </a:r>
+            <a:r>
+              <a:rPr lang="en-GB" sz="2400" dirty="0"/>
+              <a:t> </a:t>
+            </a:r>
+            <a:r>
+              <a:rPr lang="en-GB" sz="2400" dirty="0">
+                <a:solidFill>
+                  <a:schemeClr val="accent2"/>
+                </a:solidFill>
+              </a:rPr>
+              <a:t>config files</a:t>
+            </a:r>
+            <a:r>
+              <a:rPr lang="en-GB" sz="2400" dirty="0"/>
+              <a:t>)</a:t>
+            </a:r>
+          </a:p>
+          <a:p>
+            <a:pPr marL="342900" indent="-342900">
+              <a:buFont typeface="Arial" panose="020B0604020202020204" pitchFamily="34" charset="0"/>
+              <a:buChar char="•"/>
+            </a:pPr>
+            <a:endParaRPr lang="en-GB" sz="2400" dirty="0"/>
+          </a:p>
+          <a:p>
+            <a:pPr marL="342900" indent="-342900">
+              <a:buFont typeface="Arial" panose="020B0604020202020204" pitchFamily="34" charset="0"/>
+              <a:buChar char="•"/>
+            </a:pPr>
+            <a:endParaRPr lang="en-GB" sz="2400" dirty="0"/>
+          </a:p>
+          <a:p>
+            <a:endParaRPr lang="en-GB" sz="2400" dirty="0"/>
+          </a:p>
+          <a:p>
+            <a:pPr marL="342900" indent="-342900">
+              <a:buFont typeface="Arial" panose="020B0604020202020204" pitchFamily="34" charset="0"/>
+              <a:buChar char="•"/>
+            </a:pPr>
+            <a:r>
+              <a:rPr lang="en-GB" sz="2400" dirty="0"/>
+              <a:t>Or inside a </a:t>
+            </a:r>
+            <a:r>
+              <a:rPr lang="en-GB" sz="2400" dirty="0">
+                <a:solidFill>
+                  <a:schemeClr val="accent2"/>
+                </a:solidFill>
+              </a:rPr>
+              <a:t>choose_</a:t>
+            </a:r>
+          </a:p>
+          <a:p>
+            <a:endParaRPr lang="en-GB" sz="2400" b="1" dirty="0"/>
+          </a:p>
+          <a:p>
+            <a:endParaRPr lang="en-GB" sz="2400" dirty="0"/>
+          </a:p>
+        </p:txBody>
+      </p:sp>
+      <p:sp>
+        <p:nvSpPr>
+          <p:cNvPr id="11" name="Rectangle 10">
+            <a:extLst>
+              <a:ext uri="{FF2B5EF4-FFF2-40B4-BE49-F238E27FC236}">
+                <a16:creationId xmlns:a16="http://schemas.microsoft.com/office/drawing/2014/main" id="{16185526-38EC-9629-0A02-E552824EC925}"/>
+              </a:ext>
+            </a:extLst>
+          </p:cNvPr>
+          <p:cNvSpPr/>
+          <p:nvPr/>
+        </p:nvSpPr>
+        <p:spPr>
+          <a:xfrm>
+            <a:off x="5980966" y="4962124"/>
+            <a:ext cx="4825438" cy="1715854"/>
+          </a:xfrm>
+          <a:prstGeom prst="rect">
+            <a:avLst/>
+          </a:prstGeom>
+          <a:ln>
+            <a:solidFill>
+              <a:schemeClr val="tx1"/>
+            </a:solidFill>
+          </a:ln>
+        </p:spPr>
+        <p:txBody>
+          <a:bodyPr wrap="square">
+            <a:spAutoFit/>
+          </a:bodyPr>
+          <a:lstStyle/>
+          <a:p>
+            <a:r>
+              <a:rPr lang="en-GB" sz="1100" b="1" dirty="0" err="1"/>
+              <a:t>your_runscript.yaml</a:t>
+            </a:r>
+            <a:endParaRPr lang="en-US" sz="1100" dirty="0">
+              <a:solidFill>
+                <a:srgbClr val="0E6E35"/>
+              </a:solidFill>
+              <a:latin typeface="Courier" pitchFamily="2" charset="0"/>
+            </a:endParaRPr>
+          </a:p>
+          <a:p>
+            <a:r>
+              <a:rPr lang="en-US" sz="1050" dirty="0" err="1">
+                <a:solidFill>
+                  <a:srgbClr val="0E6E35"/>
+                </a:solidFill>
+                <a:latin typeface="Courier" pitchFamily="2" charset="0"/>
+              </a:rPr>
+              <a:t>fesom</a:t>
+            </a:r>
+            <a:r>
+              <a:rPr lang="en-US" sz="1050" dirty="0">
+                <a:solidFill>
+                  <a:srgbClr val="0E6E35"/>
+                </a:solidFill>
+                <a:latin typeface="Courier" pitchFamily="2" charset="0"/>
+              </a:rPr>
+              <a:t>:</a:t>
+            </a:r>
+          </a:p>
+          <a:p>
+            <a:r>
+              <a:rPr lang="en-US" sz="1050" dirty="0">
+                <a:solidFill>
+                  <a:srgbClr val="008000"/>
+                </a:solidFill>
+              </a:rPr>
+              <a:t>        </a:t>
+            </a:r>
+            <a:r>
+              <a:rPr lang="en-US" sz="1050" dirty="0" err="1">
+                <a:solidFill>
+                  <a:srgbClr val="008000"/>
+                </a:solidFill>
+              </a:rPr>
+              <a:t>icb_code</a:t>
+            </a:r>
+            <a:r>
+              <a:rPr lang="en-US" sz="1050" b="1" dirty="0">
+                <a:solidFill>
+                  <a:srgbClr val="A52A2A"/>
+                </a:solidFill>
+              </a:rPr>
+              <a:t>: </a:t>
+            </a:r>
+            <a:r>
+              <a:rPr lang="en-US" sz="1050" dirty="0"/>
+              <a:t>True</a:t>
+            </a:r>
+          </a:p>
+          <a:p>
+            <a:r>
+              <a:rPr lang="en-US" sz="1050" dirty="0"/>
+              <a:t>        </a:t>
+            </a:r>
+            <a:r>
+              <a:rPr lang="en-US" sz="1050" dirty="0" err="1">
+                <a:solidFill>
+                  <a:srgbClr val="008000"/>
+                </a:solidFill>
+              </a:rPr>
+              <a:t>my_choice</a:t>
+            </a:r>
+            <a:r>
+              <a:rPr lang="en-US" sz="1050" b="1" dirty="0">
+                <a:solidFill>
+                  <a:srgbClr val="A52A2A"/>
+                </a:solidFill>
+              </a:rPr>
+              <a:t>: </a:t>
+            </a:r>
+            <a:r>
+              <a:rPr lang="en-US" sz="1050" dirty="0"/>
+              <a:t>True</a:t>
+            </a:r>
+          </a:p>
+          <a:p>
+            <a:r>
+              <a:rPr lang="en-US" sz="1050" dirty="0"/>
+              <a:t>        </a:t>
+            </a:r>
+            <a:r>
+              <a:rPr lang="en-US" sz="1050" dirty="0" err="1">
+                <a:solidFill>
+                  <a:srgbClr val="008000"/>
+                </a:solidFill>
+              </a:rPr>
+              <a:t>choose_my_choice</a:t>
+            </a:r>
+            <a:r>
+              <a:rPr lang="en-US" sz="1050" b="1" dirty="0">
+                <a:solidFill>
+                  <a:srgbClr val="A52A2A"/>
+                </a:solidFill>
+              </a:rPr>
+              <a:t>:</a:t>
+            </a:r>
+          </a:p>
+          <a:p>
+            <a:r>
+              <a:rPr lang="en-US" sz="1050" b="1" dirty="0">
+                <a:solidFill>
+                  <a:srgbClr val="A52A2A"/>
+                </a:solidFill>
+              </a:rPr>
+              <a:t>                  True:</a:t>
+            </a:r>
+            <a:r>
+              <a:rPr lang="en-US" sz="1050" dirty="0"/>
+              <a:t>      </a:t>
+            </a:r>
+            <a:endParaRPr lang="en-GB" sz="1050" dirty="0"/>
+          </a:p>
+          <a:p>
+            <a:r>
+              <a:rPr lang="en-US" sz="1050" dirty="0">
+                <a:solidFill>
+                  <a:srgbClr val="0E6E35"/>
+                </a:solidFill>
+                <a:latin typeface="Courier" pitchFamily="2" charset="0"/>
+              </a:rPr>
+              <a:t>           </a:t>
+            </a:r>
+            <a:r>
+              <a:rPr lang="en-US" sz="1050" b="1" dirty="0" err="1">
+                <a:solidFill>
+                  <a:srgbClr val="0E6E35"/>
+                </a:solidFill>
+                <a:latin typeface="Courier" pitchFamily="2" charset="0"/>
+              </a:rPr>
+              <a:t>add_</a:t>
+            </a:r>
+            <a:r>
+              <a:rPr lang="en-US" sz="1050" dirty="0" err="1">
+                <a:solidFill>
+                  <a:srgbClr val="0E6E35"/>
+                </a:solidFill>
+                <a:latin typeface="Courier" pitchFamily="2" charset="0"/>
+              </a:rPr>
+              <a:t>namelist_changes</a:t>
+            </a:r>
+            <a:r>
+              <a:rPr lang="en-US" sz="1050" dirty="0">
+                <a:solidFill>
+                  <a:srgbClr val="000000"/>
+                </a:solidFill>
+                <a:latin typeface="Courier" pitchFamily="2" charset="0"/>
+              </a:rPr>
+              <a:t>:</a:t>
+            </a:r>
+          </a:p>
+          <a:p>
+            <a:r>
+              <a:rPr lang="en-US" sz="1050" dirty="0">
+                <a:solidFill>
+                  <a:srgbClr val="0E6E35"/>
+                </a:solidFill>
+                <a:latin typeface="Courier" pitchFamily="2" charset="0"/>
+              </a:rPr>
+              <a:t>               </a:t>
+            </a:r>
+            <a:r>
+              <a:rPr lang="en-US" sz="1050" dirty="0" err="1">
+                <a:solidFill>
+                  <a:srgbClr val="0E6E35"/>
+                </a:solidFill>
+                <a:latin typeface="Courier" pitchFamily="2" charset="0"/>
+              </a:rPr>
+              <a:t>namelist.config</a:t>
+            </a:r>
+            <a:r>
+              <a:rPr lang="en-US" sz="1050" dirty="0">
+                <a:solidFill>
+                  <a:srgbClr val="000000"/>
+                </a:solidFill>
+                <a:latin typeface="Courier" pitchFamily="2" charset="0"/>
+              </a:rPr>
+              <a:t>:</a:t>
+            </a:r>
+          </a:p>
+          <a:p>
+            <a:r>
+              <a:rPr lang="en-US" sz="1050" dirty="0">
+                <a:solidFill>
+                  <a:srgbClr val="0E6E35"/>
+                </a:solidFill>
+                <a:latin typeface="Courier" pitchFamily="2" charset="0"/>
+              </a:rPr>
+              <a:t>                   icebergs</a:t>
+            </a:r>
+            <a:r>
+              <a:rPr lang="en-US" sz="1050" dirty="0">
+                <a:solidFill>
+                  <a:srgbClr val="000000"/>
+                </a:solidFill>
+                <a:latin typeface="Courier" pitchFamily="2" charset="0"/>
+              </a:rPr>
+              <a:t>:</a:t>
+            </a:r>
+          </a:p>
+          <a:p>
+            <a:r>
+              <a:rPr lang="en-US" sz="1050" b="1" dirty="0">
+                <a:solidFill>
+                  <a:srgbClr val="000000"/>
+                </a:solidFill>
+                <a:latin typeface="Courier" pitchFamily="2" charset="0"/>
+              </a:rPr>
+              <a:t>        </a:t>
+            </a:r>
+            <a:r>
+              <a:rPr lang="en-US" sz="1050" b="1" dirty="0">
+                <a:solidFill>
+                  <a:srgbClr val="0F7001"/>
+                </a:solidFill>
+                <a:latin typeface="Courier" pitchFamily="2" charset="0"/>
+              </a:rPr>
+              <a:t>               </a:t>
+            </a:r>
+            <a:r>
+              <a:rPr lang="en-US" sz="1050" b="1" dirty="0" err="1">
+                <a:solidFill>
+                  <a:srgbClr val="0F7001"/>
+                </a:solidFill>
+                <a:latin typeface="Courier" pitchFamily="2" charset="0"/>
+              </a:rPr>
+              <a:t>steps_per_ib_step</a:t>
+            </a:r>
+            <a:r>
+              <a:rPr lang="en-US" sz="1050" b="1" dirty="0">
+                <a:solidFill>
+                  <a:srgbClr val="921A20"/>
+                </a:solidFill>
+                <a:latin typeface="Courier-Bold" pitchFamily="2" charset="0"/>
+              </a:rPr>
+              <a:t>: </a:t>
+            </a:r>
+            <a:r>
+              <a:rPr lang="en-US" sz="1050" b="1" dirty="0">
+                <a:solidFill>
+                  <a:srgbClr val="000000"/>
+                </a:solidFill>
+                <a:latin typeface="Courier" pitchFamily="2" charset="0"/>
+              </a:rPr>
+              <a:t>3</a:t>
+            </a:r>
+            <a:endParaRPr lang="en-US" sz="1050" b="1" dirty="0"/>
+          </a:p>
+        </p:txBody>
+      </p:sp>
+      <p:sp>
+        <p:nvSpPr>
+          <p:cNvPr id="12" name="Rectangle 11">
+            <a:extLst>
+              <a:ext uri="{FF2B5EF4-FFF2-40B4-BE49-F238E27FC236}">
+                <a16:creationId xmlns:a16="http://schemas.microsoft.com/office/drawing/2014/main" id="{CAEA11E0-8648-5FF6-6F9D-7BFD90C32D7C}"/>
+              </a:ext>
+            </a:extLst>
+          </p:cNvPr>
+          <p:cNvSpPr/>
+          <p:nvPr/>
+        </p:nvSpPr>
+        <p:spPr>
+          <a:xfrm>
+            <a:off x="5546626" y="2277576"/>
+            <a:ext cx="3510798" cy="1415772"/>
+          </a:xfrm>
+          <a:prstGeom prst="rect">
+            <a:avLst/>
+          </a:prstGeom>
+          <a:ln>
+            <a:solidFill>
+              <a:schemeClr val="tx1"/>
+            </a:solidFill>
+          </a:ln>
+        </p:spPr>
+        <p:txBody>
+          <a:bodyPr wrap="square">
+            <a:spAutoFit/>
+          </a:bodyPr>
+          <a:lstStyle/>
+          <a:p>
+            <a:r>
+              <a:rPr lang="en-GB" sz="1400" b="1" dirty="0" err="1"/>
+              <a:t>your_runscript.yaml</a:t>
+            </a:r>
+            <a:endParaRPr lang="en-US" sz="1400" dirty="0">
+              <a:solidFill>
+                <a:srgbClr val="0E6E35"/>
+              </a:solidFill>
+              <a:latin typeface="Courier" pitchFamily="2" charset="0"/>
+            </a:endParaRPr>
+          </a:p>
+          <a:p>
+            <a:r>
+              <a:rPr lang="en-US" sz="1200" dirty="0" err="1">
+                <a:solidFill>
+                  <a:srgbClr val="0E6E35"/>
+                </a:solidFill>
+                <a:latin typeface="Courier" pitchFamily="2" charset="0"/>
+              </a:rPr>
+              <a:t>fesom</a:t>
+            </a:r>
+            <a:r>
+              <a:rPr lang="en-US" sz="1200" dirty="0">
+                <a:solidFill>
+                  <a:srgbClr val="0E6E35"/>
+                </a:solidFill>
+                <a:latin typeface="Courier" pitchFamily="2" charset="0"/>
+              </a:rPr>
+              <a:t>:</a:t>
+            </a:r>
+          </a:p>
+          <a:p>
+            <a:r>
+              <a:rPr lang="en-US" sz="1200" dirty="0">
+                <a:solidFill>
+                  <a:srgbClr val="0E6E35"/>
+                </a:solidFill>
+                <a:latin typeface="Courier" pitchFamily="2" charset="0"/>
+              </a:rPr>
+              <a:t>   </a:t>
+            </a:r>
+            <a:r>
+              <a:rPr lang="en-US" sz="1200" dirty="0" err="1">
+                <a:solidFill>
+                  <a:srgbClr val="008000"/>
+                </a:solidFill>
+              </a:rPr>
+              <a:t>icb_code</a:t>
+            </a:r>
+            <a:r>
+              <a:rPr lang="en-US" sz="1200" b="1" dirty="0">
+                <a:solidFill>
+                  <a:srgbClr val="A52A2A"/>
+                </a:solidFill>
+              </a:rPr>
+              <a:t>: </a:t>
+            </a:r>
+            <a:r>
+              <a:rPr lang="en-US" sz="1200" dirty="0"/>
+              <a:t>True</a:t>
+            </a:r>
+            <a:endParaRPr lang="en-GB" sz="1200" dirty="0"/>
+          </a:p>
+          <a:p>
+            <a:r>
+              <a:rPr lang="en-US" sz="1200" dirty="0">
+                <a:solidFill>
+                  <a:srgbClr val="0E6E35"/>
+                </a:solidFill>
+                <a:latin typeface="Courier" pitchFamily="2" charset="0"/>
+              </a:rPr>
+              <a:t>   </a:t>
+            </a:r>
+            <a:r>
+              <a:rPr lang="en-US" sz="1200" dirty="0" err="1">
+                <a:solidFill>
+                  <a:srgbClr val="0E6E35"/>
+                </a:solidFill>
+                <a:latin typeface="Courier" pitchFamily="2" charset="0"/>
+              </a:rPr>
+              <a:t>namelist_changes</a:t>
+            </a:r>
+            <a:r>
+              <a:rPr lang="en-US" sz="1200" dirty="0">
+                <a:solidFill>
+                  <a:srgbClr val="000000"/>
+                </a:solidFill>
+                <a:latin typeface="Courier" pitchFamily="2" charset="0"/>
+              </a:rPr>
+              <a:t>:</a:t>
+            </a:r>
+          </a:p>
+          <a:p>
+            <a:r>
+              <a:rPr lang="en-US" sz="1200" dirty="0">
+                <a:solidFill>
+                  <a:srgbClr val="0E6E35"/>
+                </a:solidFill>
+                <a:latin typeface="Courier" pitchFamily="2" charset="0"/>
+              </a:rPr>
+              <a:t>       </a:t>
+            </a:r>
+            <a:r>
+              <a:rPr lang="en-US" sz="1200" b="1" dirty="0" err="1">
+                <a:solidFill>
+                  <a:srgbClr val="0E6E35"/>
+                </a:solidFill>
+                <a:latin typeface="Courier" pitchFamily="2" charset="0"/>
+              </a:rPr>
+              <a:t>add_</a:t>
+            </a:r>
+            <a:r>
+              <a:rPr lang="en-US" sz="1200" dirty="0" err="1">
+                <a:solidFill>
+                  <a:srgbClr val="0E6E35"/>
+                </a:solidFill>
+                <a:latin typeface="Courier" pitchFamily="2" charset="0"/>
+              </a:rPr>
+              <a:t>namelist.config</a:t>
+            </a:r>
+            <a:r>
+              <a:rPr lang="en-US" sz="1200" dirty="0">
+                <a:solidFill>
+                  <a:srgbClr val="000000"/>
+                </a:solidFill>
+                <a:latin typeface="Courier" pitchFamily="2" charset="0"/>
+              </a:rPr>
+              <a:t>:</a:t>
+            </a:r>
+          </a:p>
+          <a:p>
+            <a:r>
+              <a:rPr lang="en-US" sz="1200" dirty="0">
+                <a:solidFill>
+                  <a:srgbClr val="0E6E35"/>
+                </a:solidFill>
+                <a:latin typeface="Courier" pitchFamily="2" charset="0"/>
+              </a:rPr>
+              <a:t>           icebergs</a:t>
+            </a:r>
+            <a:r>
+              <a:rPr lang="en-US" sz="1200" dirty="0">
+                <a:solidFill>
+                  <a:srgbClr val="000000"/>
+                </a:solidFill>
+                <a:latin typeface="Courier" pitchFamily="2" charset="0"/>
+              </a:rPr>
+              <a:t>:</a:t>
+            </a:r>
+          </a:p>
+          <a:p>
+            <a:r>
+              <a:rPr lang="en-US" sz="1200" b="1" dirty="0">
+                <a:solidFill>
+                  <a:srgbClr val="000000"/>
+                </a:solidFill>
+                <a:latin typeface="Courier" pitchFamily="2" charset="0"/>
+              </a:rPr>
+              <a:t>        </a:t>
+            </a:r>
+            <a:r>
+              <a:rPr lang="en-US" sz="1200" b="1" dirty="0">
+                <a:solidFill>
+                  <a:srgbClr val="0F7001"/>
+                </a:solidFill>
+                <a:latin typeface="Courier" pitchFamily="2" charset="0"/>
+              </a:rPr>
+              <a:t>       </a:t>
+            </a:r>
+            <a:r>
+              <a:rPr lang="en-US" sz="1200" b="1" dirty="0" err="1">
+                <a:solidFill>
+                  <a:srgbClr val="0F7001"/>
+                </a:solidFill>
+                <a:latin typeface="Courier" pitchFamily="2" charset="0"/>
+              </a:rPr>
+              <a:t>steps_per_ib_step</a:t>
+            </a:r>
+            <a:r>
+              <a:rPr lang="en-US" sz="1200" b="1" dirty="0">
+                <a:solidFill>
+                  <a:srgbClr val="921A20"/>
+                </a:solidFill>
+                <a:latin typeface="Courier-Bold" pitchFamily="2" charset="0"/>
+              </a:rPr>
+              <a:t>: </a:t>
+            </a:r>
+            <a:r>
+              <a:rPr lang="en-US" sz="1200" b="1" dirty="0">
+                <a:solidFill>
+                  <a:srgbClr val="000000"/>
+                </a:solidFill>
+                <a:latin typeface="Courier" pitchFamily="2" charset="0"/>
+              </a:rPr>
+              <a:t>3</a:t>
+            </a:r>
+            <a:endParaRPr lang="en-US" sz="1200" b="1" dirty="0"/>
+          </a:p>
+        </p:txBody>
+      </p:sp>
+      <p:grpSp>
+        <p:nvGrpSpPr>
+          <p:cNvPr id="15" name="Group 14">
+            <a:extLst>
+              <a:ext uri="{FF2B5EF4-FFF2-40B4-BE49-F238E27FC236}">
+                <a16:creationId xmlns:a16="http://schemas.microsoft.com/office/drawing/2014/main" id="{AAAA4417-7BE3-8C64-0F52-682ABCAB3FFE}"/>
+              </a:ext>
+            </a:extLst>
+          </p:cNvPr>
+          <p:cNvGrpSpPr/>
+          <p:nvPr/>
+        </p:nvGrpSpPr>
+        <p:grpSpPr>
+          <a:xfrm>
+            <a:off x="5554980" y="2277576"/>
+            <a:ext cx="3531870" cy="1415772"/>
+            <a:chOff x="5554980" y="2974806"/>
+            <a:chExt cx="3531870" cy="1415772"/>
+          </a:xfrm>
+        </p:grpSpPr>
+        <p:cxnSp>
+          <p:nvCxnSpPr>
+            <p:cNvPr id="4" name="Straight Connector 3">
+              <a:extLst>
+                <a:ext uri="{FF2B5EF4-FFF2-40B4-BE49-F238E27FC236}">
+                  <a16:creationId xmlns:a16="http://schemas.microsoft.com/office/drawing/2014/main" id="{5E3A8A7B-63DF-DE41-D046-0B300B32EF68}"/>
+                </a:ext>
+              </a:extLst>
+            </p:cNvPr>
+            <p:cNvCxnSpPr/>
+            <p:nvPr/>
+          </p:nvCxnSpPr>
+          <p:spPr>
+            <a:xfrm>
+              <a:off x="5554980" y="2974806"/>
+              <a:ext cx="3531870" cy="1415772"/>
+            </a:xfrm>
+            <a:prstGeom prst="line">
+              <a:avLst/>
+            </a:prstGeom>
+            <a:ln w="28575">
+              <a:solidFill>
+                <a:srgbClr val="FF0000"/>
+              </a:solidFill>
+            </a:ln>
+          </p:spPr>
+          <p:style>
+            <a:lnRef idx="1">
+              <a:schemeClr val="accent1"/>
+            </a:lnRef>
+            <a:fillRef idx="0">
+              <a:schemeClr val="accent1"/>
+            </a:fillRef>
+            <a:effectRef idx="0">
+              <a:schemeClr val="accent1"/>
+            </a:effectRef>
+            <a:fontRef idx="minor">
+              <a:schemeClr val="tx1"/>
+            </a:fontRef>
+          </p:style>
+        </p:cxnSp>
+        <p:cxnSp>
+          <p:nvCxnSpPr>
+            <p:cNvPr id="13" name="Straight Connector 12">
+              <a:extLst>
+                <a:ext uri="{FF2B5EF4-FFF2-40B4-BE49-F238E27FC236}">
+                  <a16:creationId xmlns:a16="http://schemas.microsoft.com/office/drawing/2014/main" id="{6F6709B9-C996-6748-4800-7D88641D9427}"/>
+                </a:ext>
+              </a:extLst>
+            </p:cNvPr>
+            <p:cNvCxnSpPr>
+              <a:cxnSpLocks/>
+            </p:cNvCxnSpPr>
+            <p:nvPr/>
+          </p:nvCxnSpPr>
+          <p:spPr>
+            <a:xfrm flipV="1">
+              <a:off x="5563334" y="2974806"/>
+              <a:ext cx="3494090" cy="1415772"/>
+            </a:xfrm>
+            <a:prstGeom prst="line">
+              <a:avLst/>
+            </a:prstGeom>
+            <a:ln w="28575">
+              <a:solidFill>
+                <a:srgbClr val="FF0000"/>
+              </a:solidFill>
+            </a:ln>
+          </p:spPr>
+          <p:style>
+            <a:lnRef idx="1">
+              <a:schemeClr val="accent1"/>
+            </a:lnRef>
+            <a:fillRef idx="0">
+              <a:schemeClr val="accent1"/>
+            </a:fillRef>
+            <a:effectRef idx="0">
+              <a:schemeClr val="accent1"/>
+            </a:effectRef>
+            <a:fontRef idx="minor">
+              <a:schemeClr val="tx1"/>
+            </a:fontRef>
+          </p:style>
+        </p:cxnSp>
+      </p:grpSp>
+      <p:sp>
+        <p:nvSpPr>
+          <p:cNvPr id="16" name="Rectangle 15">
+            <a:extLst>
+              <a:ext uri="{FF2B5EF4-FFF2-40B4-BE49-F238E27FC236}">
+                <a16:creationId xmlns:a16="http://schemas.microsoft.com/office/drawing/2014/main" id="{7251BA42-4795-B946-F968-EEBF0A36147C}"/>
+              </a:ext>
+            </a:extLst>
+          </p:cNvPr>
+          <p:cNvSpPr/>
+          <p:nvPr/>
+        </p:nvSpPr>
+        <p:spPr>
+          <a:xfrm>
+            <a:off x="1883972" y="4094064"/>
+            <a:ext cx="3510798" cy="1069524"/>
+          </a:xfrm>
+          <a:prstGeom prst="rect">
+            <a:avLst/>
+          </a:prstGeom>
+          <a:ln>
+            <a:solidFill>
+              <a:schemeClr val="tx1"/>
+            </a:solidFill>
+          </a:ln>
+        </p:spPr>
+        <p:txBody>
+          <a:bodyPr wrap="square">
+            <a:spAutoFit/>
+          </a:bodyPr>
+          <a:lstStyle/>
+          <a:p>
+            <a:r>
+              <a:rPr lang="en-GB" sz="1100" b="1" dirty="0"/>
+              <a:t>fesom-2.1.yaml</a:t>
+            </a:r>
+            <a:endParaRPr lang="en-US" sz="1100" dirty="0">
+              <a:solidFill>
+                <a:srgbClr val="0E6E35"/>
+              </a:solidFill>
+              <a:latin typeface="Courier" pitchFamily="2" charset="0"/>
+            </a:endParaRPr>
+          </a:p>
+          <a:p>
+            <a:r>
+              <a:rPr lang="en-US" sz="1050" dirty="0" err="1">
+                <a:solidFill>
+                  <a:srgbClr val="008000"/>
+                </a:solidFill>
+              </a:rPr>
+              <a:t>icb_code</a:t>
+            </a:r>
+            <a:r>
+              <a:rPr lang="en-US" sz="1050" b="1" dirty="0">
+                <a:solidFill>
+                  <a:srgbClr val="A52A2A"/>
+                </a:solidFill>
+              </a:rPr>
+              <a:t>: </a:t>
+            </a:r>
+            <a:r>
+              <a:rPr lang="en-US" sz="1050" dirty="0"/>
+              <a:t>True</a:t>
+            </a:r>
+            <a:endParaRPr lang="en-GB" sz="1050" dirty="0"/>
+          </a:p>
+          <a:p>
+            <a:r>
+              <a:rPr lang="en-US" sz="1050" b="1" dirty="0" err="1">
+                <a:solidFill>
+                  <a:srgbClr val="0E6E35"/>
+                </a:solidFill>
+                <a:latin typeface="Courier" pitchFamily="2" charset="0"/>
+              </a:rPr>
+              <a:t>add_</a:t>
+            </a:r>
+            <a:r>
+              <a:rPr lang="en-US" sz="1050" dirty="0" err="1">
+                <a:solidFill>
+                  <a:srgbClr val="0E6E35"/>
+                </a:solidFill>
+                <a:latin typeface="Courier" pitchFamily="2" charset="0"/>
+              </a:rPr>
+              <a:t>namelist_changes</a:t>
+            </a:r>
+            <a:r>
+              <a:rPr lang="en-US" sz="1050" dirty="0">
+                <a:solidFill>
+                  <a:srgbClr val="000000"/>
+                </a:solidFill>
+                <a:latin typeface="Courier" pitchFamily="2" charset="0"/>
+              </a:rPr>
+              <a:t>:</a:t>
+            </a:r>
+          </a:p>
+          <a:p>
+            <a:r>
+              <a:rPr lang="en-US" sz="1050" dirty="0">
+                <a:solidFill>
+                  <a:srgbClr val="0E6E35"/>
+                </a:solidFill>
+                <a:latin typeface="Courier" pitchFamily="2" charset="0"/>
+              </a:rPr>
+              <a:t>    </a:t>
+            </a:r>
+            <a:r>
+              <a:rPr lang="en-US" sz="1050" dirty="0" err="1">
+                <a:solidFill>
+                  <a:srgbClr val="0E6E35"/>
+                </a:solidFill>
+                <a:latin typeface="Courier" pitchFamily="2" charset="0"/>
+              </a:rPr>
+              <a:t>namelist.config</a:t>
+            </a:r>
+            <a:r>
+              <a:rPr lang="en-US" sz="1050" dirty="0">
+                <a:solidFill>
+                  <a:srgbClr val="000000"/>
+                </a:solidFill>
+                <a:latin typeface="Courier" pitchFamily="2" charset="0"/>
+              </a:rPr>
+              <a:t>:</a:t>
+            </a:r>
+          </a:p>
+          <a:p>
+            <a:r>
+              <a:rPr lang="en-US" sz="1050" dirty="0">
+                <a:solidFill>
+                  <a:srgbClr val="0E6E35"/>
+                </a:solidFill>
+                <a:latin typeface="Courier" pitchFamily="2" charset="0"/>
+              </a:rPr>
+              <a:t>       icebergs</a:t>
+            </a:r>
+            <a:r>
+              <a:rPr lang="en-US" sz="1050" dirty="0">
+                <a:solidFill>
+                  <a:srgbClr val="000000"/>
+                </a:solidFill>
+                <a:latin typeface="Courier" pitchFamily="2" charset="0"/>
+              </a:rPr>
+              <a:t>:</a:t>
+            </a:r>
+          </a:p>
+          <a:p>
+            <a:r>
+              <a:rPr lang="en-US" sz="1050" b="1" dirty="0">
+                <a:solidFill>
+                  <a:srgbClr val="000000"/>
+                </a:solidFill>
+                <a:latin typeface="Courier" pitchFamily="2" charset="0"/>
+              </a:rPr>
+              <a:t>    </a:t>
+            </a:r>
+            <a:r>
+              <a:rPr lang="en-US" sz="1050" b="1" dirty="0">
+                <a:solidFill>
+                  <a:srgbClr val="0F7001"/>
+                </a:solidFill>
+                <a:latin typeface="Courier" pitchFamily="2" charset="0"/>
+              </a:rPr>
+              <a:t>       </a:t>
+            </a:r>
+            <a:r>
+              <a:rPr lang="en-US" sz="1050" b="1" dirty="0" err="1">
+                <a:solidFill>
+                  <a:srgbClr val="0F7001"/>
+                </a:solidFill>
+                <a:latin typeface="Courier" pitchFamily="2" charset="0"/>
+              </a:rPr>
+              <a:t>steps_per_ib_step</a:t>
+            </a:r>
+            <a:r>
+              <a:rPr lang="en-US" sz="1050" b="1" dirty="0">
+                <a:solidFill>
+                  <a:srgbClr val="921A20"/>
+                </a:solidFill>
+                <a:latin typeface="Courier-Bold" pitchFamily="2" charset="0"/>
+              </a:rPr>
+              <a:t>: </a:t>
+            </a:r>
+            <a:r>
+              <a:rPr lang="en-US" sz="1050" b="1" dirty="0">
+                <a:solidFill>
+                  <a:srgbClr val="000000"/>
+                </a:solidFill>
+                <a:latin typeface="Courier" pitchFamily="2" charset="0"/>
+              </a:rPr>
+              <a:t>3</a:t>
+            </a:r>
+            <a:endParaRPr lang="en-US" sz="1050" b="1" dirty="0"/>
+          </a:p>
+        </p:txBody>
+      </p:sp>
+      <p:sp>
+        <p:nvSpPr>
+          <p:cNvPr id="18" name="Rectangle 17">
+            <a:extLst>
+              <a:ext uri="{FF2B5EF4-FFF2-40B4-BE49-F238E27FC236}">
+                <a16:creationId xmlns:a16="http://schemas.microsoft.com/office/drawing/2014/main" id="{228C57B9-270A-8D61-D43E-2D196E2353EE}"/>
+              </a:ext>
+            </a:extLst>
+          </p:cNvPr>
+          <p:cNvSpPr/>
+          <p:nvPr/>
+        </p:nvSpPr>
+        <p:spPr>
+          <a:xfrm>
+            <a:off x="1213412" y="2283518"/>
+            <a:ext cx="3510798" cy="1415772"/>
+          </a:xfrm>
+          <a:prstGeom prst="rect">
+            <a:avLst/>
+          </a:prstGeom>
+          <a:ln>
+            <a:solidFill>
+              <a:schemeClr val="tx1"/>
+            </a:solidFill>
+          </a:ln>
+        </p:spPr>
+        <p:txBody>
+          <a:bodyPr wrap="square">
+            <a:spAutoFit/>
+          </a:bodyPr>
+          <a:lstStyle/>
+          <a:p>
+            <a:r>
+              <a:rPr lang="en-GB" sz="1400" b="1" dirty="0" err="1"/>
+              <a:t>your_runscript.yaml</a:t>
+            </a:r>
+            <a:endParaRPr lang="en-US" sz="1400" dirty="0">
+              <a:solidFill>
+                <a:srgbClr val="0E6E35"/>
+              </a:solidFill>
+              <a:latin typeface="Courier" pitchFamily="2" charset="0"/>
+            </a:endParaRPr>
+          </a:p>
+          <a:p>
+            <a:r>
+              <a:rPr lang="en-US" sz="1200" dirty="0" err="1">
+                <a:solidFill>
+                  <a:srgbClr val="0E6E35"/>
+                </a:solidFill>
+                <a:latin typeface="Courier" pitchFamily="2" charset="0"/>
+              </a:rPr>
+              <a:t>fesom</a:t>
+            </a:r>
+            <a:r>
+              <a:rPr lang="en-US" sz="1200" dirty="0">
+                <a:solidFill>
+                  <a:srgbClr val="0E6E35"/>
+                </a:solidFill>
+                <a:latin typeface="Courier" pitchFamily="2" charset="0"/>
+              </a:rPr>
+              <a:t>:</a:t>
+            </a:r>
+          </a:p>
+          <a:p>
+            <a:r>
+              <a:rPr lang="en-US" sz="1200" dirty="0">
+                <a:solidFill>
+                  <a:srgbClr val="0E6E35"/>
+                </a:solidFill>
+                <a:latin typeface="Courier" pitchFamily="2" charset="0"/>
+              </a:rPr>
+              <a:t>   </a:t>
+            </a:r>
+            <a:r>
+              <a:rPr lang="en-US" sz="1200" dirty="0" err="1">
+                <a:solidFill>
+                  <a:srgbClr val="008000"/>
+                </a:solidFill>
+              </a:rPr>
+              <a:t>icb_code</a:t>
+            </a:r>
+            <a:r>
+              <a:rPr lang="en-US" sz="1200" b="1" dirty="0">
+                <a:solidFill>
+                  <a:srgbClr val="A52A2A"/>
+                </a:solidFill>
+              </a:rPr>
+              <a:t>: </a:t>
+            </a:r>
+            <a:r>
+              <a:rPr lang="en-US" sz="1200" dirty="0"/>
+              <a:t>True</a:t>
+            </a:r>
+            <a:endParaRPr lang="en-GB" sz="1200" dirty="0"/>
+          </a:p>
+          <a:p>
+            <a:r>
+              <a:rPr lang="en-US" sz="1200" dirty="0">
+                <a:solidFill>
+                  <a:srgbClr val="0E6E35"/>
+                </a:solidFill>
+                <a:latin typeface="Courier" pitchFamily="2" charset="0"/>
+              </a:rPr>
+              <a:t>   </a:t>
+            </a:r>
+            <a:r>
+              <a:rPr lang="en-US" sz="1200" b="1" dirty="0" err="1">
+                <a:solidFill>
+                  <a:srgbClr val="0E6E35"/>
+                </a:solidFill>
+                <a:latin typeface="Courier" pitchFamily="2" charset="0"/>
+              </a:rPr>
+              <a:t>add_</a:t>
+            </a:r>
+            <a:r>
+              <a:rPr lang="en-US" sz="1200" dirty="0" err="1">
+                <a:solidFill>
+                  <a:srgbClr val="0E6E35"/>
+                </a:solidFill>
+                <a:latin typeface="Courier" pitchFamily="2" charset="0"/>
+              </a:rPr>
+              <a:t>namelist_changes</a:t>
+            </a:r>
+            <a:r>
+              <a:rPr lang="en-US" sz="1200" dirty="0">
+                <a:solidFill>
+                  <a:srgbClr val="000000"/>
+                </a:solidFill>
+                <a:latin typeface="Courier" pitchFamily="2" charset="0"/>
+              </a:rPr>
+              <a:t>:</a:t>
+            </a:r>
+          </a:p>
+          <a:p>
+            <a:r>
+              <a:rPr lang="en-US" sz="1200" dirty="0">
+                <a:solidFill>
+                  <a:srgbClr val="0E6E35"/>
+                </a:solidFill>
+                <a:latin typeface="Courier" pitchFamily="2" charset="0"/>
+              </a:rPr>
+              <a:t>       </a:t>
+            </a:r>
+            <a:r>
+              <a:rPr lang="en-US" sz="1200" dirty="0" err="1">
+                <a:solidFill>
+                  <a:srgbClr val="0E6E35"/>
+                </a:solidFill>
+                <a:latin typeface="Courier" pitchFamily="2" charset="0"/>
+              </a:rPr>
+              <a:t>namelist.config</a:t>
+            </a:r>
+            <a:r>
+              <a:rPr lang="en-US" sz="1200" dirty="0">
+                <a:solidFill>
+                  <a:srgbClr val="000000"/>
+                </a:solidFill>
+                <a:latin typeface="Courier" pitchFamily="2" charset="0"/>
+              </a:rPr>
+              <a:t>:</a:t>
+            </a:r>
+          </a:p>
+          <a:p>
+            <a:r>
+              <a:rPr lang="en-US" sz="1200" dirty="0">
+                <a:solidFill>
+                  <a:srgbClr val="0E6E35"/>
+                </a:solidFill>
+                <a:latin typeface="Courier" pitchFamily="2" charset="0"/>
+              </a:rPr>
+              <a:t>           icebergs</a:t>
+            </a:r>
+            <a:r>
+              <a:rPr lang="en-US" sz="1200" dirty="0">
+                <a:solidFill>
+                  <a:srgbClr val="000000"/>
+                </a:solidFill>
+                <a:latin typeface="Courier" pitchFamily="2" charset="0"/>
+              </a:rPr>
+              <a:t>:</a:t>
+            </a:r>
+          </a:p>
+          <a:p>
+            <a:r>
+              <a:rPr lang="en-US" sz="1200" b="1" dirty="0">
+                <a:solidFill>
+                  <a:srgbClr val="000000"/>
+                </a:solidFill>
+                <a:latin typeface="Courier" pitchFamily="2" charset="0"/>
+              </a:rPr>
+              <a:t>        </a:t>
+            </a:r>
+            <a:r>
+              <a:rPr lang="en-US" sz="1200" b="1" dirty="0">
+                <a:solidFill>
+                  <a:srgbClr val="0F7001"/>
+                </a:solidFill>
+                <a:latin typeface="Courier" pitchFamily="2" charset="0"/>
+              </a:rPr>
+              <a:t>       </a:t>
+            </a:r>
+            <a:r>
+              <a:rPr lang="en-US" sz="1200" b="1" dirty="0" err="1">
+                <a:solidFill>
+                  <a:srgbClr val="0F7001"/>
+                </a:solidFill>
+                <a:latin typeface="Courier" pitchFamily="2" charset="0"/>
+              </a:rPr>
+              <a:t>steps_per_ib_step</a:t>
+            </a:r>
+            <a:r>
+              <a:rPr lang="en-US" sz="1200" b="1" dirty="0">
+                <a:solidFill>
+                  <a:srgbClr val="921A20"/>
+                </a:solidFill>
+                <a:latin typeface="Courier-Bold" pitchFamily="2" charset="0"/>
+              </a:rPr>
+              <a:t>: </a:t>
+            </a:r>
+            <a:r>
+              <a:rPr lang="en-US" sz="1200" b="1" dirty="0">
+                <a:solidFill>
+                  <a:srgbClr val="000000"/>
+                </a:solidFill>
+                <a:latin typeface="Courier" pitchFamily="2" charset="0"/>
+              </a:rPr>
+              <a:t>3</a:t>
+            </a:r>
+            <a:endParaRPr lang="en-US" sz="1200" b="1" dirty="0"/>
+          </a:p>
+        </p:txBody>
+      </p:sp>
+    </p:spTree>
+    <p:extLst>
+      <p:ext uri="{BB962C8B-B14F-4D97-AF65-F5344CB8AC3E}">
+        <p14:creationId xmlns:p14="http://schemas.microsoft.com/office/powerpoint/2010/main" val="1834646645"/>
+      </p:ext>
+    </p:extLst>
+  </p:cSld>
+  <p:clrMapOvr>
+    <a:masterClrMapping/>
+  </p:clrMapOvr>
+  <p:timing>
+    <p:tnLst>
+      <p:par>
+        <p:cTn id="1" dur="indefinite" restart="never" nodeType="tmRoot">
+          <p:childTnLst>
+            <p:seq concurrent="1" nextAc="seek">
+              <p:cTn id="2" dur="indefinite" nodeType="mainSeq">
+                <p:childTnLst>
+                  <p:par>
+                    <p:cTn id="3" fill="hold">
+                      <p:stCondLst>
+                        <p:cond delay="indefinite"/>
+                      </p:stCondLst>
+                      <p:childTnLst>
+                        <p:par>
+                          <p:cTn id="4" fill="hold">
+                            <p:stCondLst>
+                              <p:cond delay="0"/>
+                            </p:stCondLst>
+                            <p:childTnLst>
+                              <p:par>
+                                <p:cTn id="5" presetID="1" presetClass="entr" presetSubtype="0" fill="hold" nodeType="clickEffect">
+                                  <p:stCondLst>
+                                    <p:cond delay="0"/>
+                                  </p:stCondLst>
+                                  <p:childTnLst>
+                                    <p:set>
+                                      <p:cBhvr>
+                                        <p:cTn id="6" dur="1" fill="hold">
+                                          <p:stCondLst>
+                                            <p:cond delay="0"/>
+                                          </p:stCondLst>
+                                        </p:cTn>
+                                        <p:tgtEl>
+                                          <p:spTgt spid="15"/>
+                                        </p:tgtEl>
+                                        <p:attrNameLst>
+                                          <p:attrName>style.visibility</p:attrName>
+                                        </p:attrNameLst>
+                                      </p:cBhvr>
+                                      <p:to>
+                                        <p:strVal val="visible"/>
+                                      </p:to>
+                                    </p:set>
+                                  </p:childTnLst>
+                                </p:cTn>
+                              </p:par>
+                            </p:childTnLst>
+                          </p:cTn>
+                        </p:par>
+                      </p:childTnLst>
+                    </p:cTn>
+                  </p:par>
+                </p:childTnLst>
+              </p:cTn>
+              <p:prevCondLst>
+                <p:cond evt="onPrev" delay="0">
+                  <p:tgtEl>
+                    <p:sldTgt/>
+                  </p:tgtEl>
+                </p:cond>
+              </p:prevCondLst>
+              <p:nextCondLst>
+                <p:cond evt="onNext" delay="0">
+                  <p:tgtEl>
+                    <p:sldTgt/>
+                  </p:tgtEl>
+                </p:cond>
+              </p:nextCondLst>
+            </p:seq>
+          </p:childTnLst>
+        </p:cTn>
+      </p:par>
+    </p:tnLst>
+  </p:timing>
 </p:sld>
 </file>
 

</xml_diff>